<commit_message>
redid apcs slides again
</commit_message>
<xml_diff>
--- a/print/apcsa2_6_1.pptx
+++ b/print/apcsa2_6_1.pptx
@@ -14,6 +14,7 @@
     <p:sldId id="259" r:id="rId11"/>
     <p:sldId id="260" r:id="rId12"/>
     <p:sldId id="261" r:id="rId13"/>
+    <p:sldId id="262" r:id="rId14"/>
   </p:sldIdLst>
   <p:sldSz cx="9144000" cy="5143500"/>
   <p:notesSz cx="6858000" cy="9144000"/>
@@ -6341,8 +6342,8 @@
       </p:par>
     </p:tnLst>
     <p:bldLst>
+      <p:bldP build="whole" bldLvl="1" animBg="1" rev="0" advAuto="0" spid="198" grpId="2"/>
       <p:bldP build="whole" bldLvl="1" animBg="1" rev="0" advAuto="0" spid="197" grpId="1"/>
-      <p:bldP build="whole" bldLvl="1" animBg="1" rev="0" advAuto="0" spid="198" grpId="2"/>
     </p:bldLst>
   </p:timing>
 </p:sld>
@@ -6533,7 +6534,7 @@
         </p:nvSpPr>
         <p:spPr>
           <a:xfrm>
-            <a:off x="5041092" y="1550887"/>
+            <a:off x="5066492" y="1207987"/>
             <a:ext cx="3491724" cy="698501"/>
           </a:xfrm>
           <a:prstGeom prst="rect">
@@ -6621,15 +6622,14 @@
           <a:blip r:embed="rId2">
             <a:extLst/>
           </a:blip>
-          <a:srcRect l="0" t="0" r="0" b="7880"/>
           <a:stretch>
             <a:fillRect/>
           </a:stretch>
         </p:blipFill>
         <p:spPr>
           <a:xfrm>
-            <a:off x="797062" y="1196737"/>
-            <a:ext cx="4095194" cy="1241833"/>
+            <a:off x="4446367" y="2160327"/>
+            <a:ext cx="4294789" cy="2014109"/>
           </a:xfrm>
           <a:prstGeom prst="rect">
             <a:avLst/>
@@ -6641,14 +6641,14 @@
       </p:pic>
       <p:sp>
         <p:nvSpPr>
-          <p:cNvPr id="207" name="Part (1) solution:"/>
+          <p:cNvPr id="207" name="Points earned:…"/>
           <p:cNvSpPr txBox="1"/>
           <p:nvPr/>
         </p:nvSpPr>
         <p:spPr>
           <a:xfrm>
-            <a:off x="4402608" y="2681149"/>
-            <a:ext cx="1366516" cy="215901"/>
+            <a:off x="585527" y="1344076"/>
+            <a:ext cx="3715247" cy="2895601"/>
           </a:xfrm>
           <a:prstGeom prst="rect">
             <a:avLst/>
@@ -6663,47 +6663,172 @@
           </a:extLst>
         </p:spPr>
         <p:txBody>
-          <a:bodyPr wrap="none" lIns="0" tIns="0" rIns="0" bIns="0">
+          <a:bodyPr lIns="0" tIns="0" rIns="0" bIns="0">
             <a:spAutoFit/>
           </a:bodyPr>
           <a:lstStyle/>
           <a:p>
-            <a:pPr/>
-            <a:r>
-              <a:t>Part (1) solution: </a:t>
+            <a:pPr>
+              <a:defRPr b="1" sz="1100">
+                <a:solidFill>
+                  <a:srgbClr val="000000"/>
+                </a:solidFill>
+                <a:latin typeface="Courier New"/>
+                <a:ea typeface="Courier New"/>
+                <a:cs typeface="Courier New"/>
+                <a:sym typeface="Courier New"/>
+              </a:defRPr>
+            </a:pPr>
+            <a:r>
+              <a:t>Points earned:</a:t>
+            </a:r>
+          </a:p>
+          <a:p>
+            <a:pPr>
+              <a:defRPr sz="1100">
+                <a:solidFill>
+                  <a:srgbClr val="000000"/>
+                </a:solidFill>
+                <a:latin typeface="Courier New"/>
+                <a:ea typeface="Courier New"/>
+                <a:cs typeface="Courier New"/>
+                <a:sym typeface="Courier New"/>
+              </a:defRPr>
+            </a:pPr>
+            <a:r>
+              <a:t>+1 [Skill 3.D] Constructs possibleNames</a:t>
+            </a:r>
+          </a:p>
+          <a:p>
+            <a:pPr>
+              <a:defRPr sz="1100">
+                <a:solidFill>
+                  <a:srgbClr val="000000"/>
+                </a:solidFill>
+                <a:latin typeface="Courier New"/>
+                <a:ea typeface="Courier New"/>
+                <a:cs typeface="Courier New"/>
+                <a:sym typeface="Courier New"/>
+              </a:defRPr>
+            </a:pPr>
+            <a:r>
+              <a:t>+1 [Skill 3.C] Generates substrings of all possible lengths in the context of a loop</a:t>
+            </a:r>
+          </a:p>
+          <a:p>
+            <a:pPr>
+              <a:defRPr sz="1100">
+                <a:solidFill>
+                  <a:srgbClr val="000000"/>
+                </a:solidFill>
+                <a:latin typeface="Courier New"/>
+                <a:ea typeface="Courier New"/>
+                <a:cs typeface="Courier New"/>
+                <a:sym typeface="Courier New"/>
+              </a:defRPr>
+            </a:pPr>
+            <a:r>
+              <a:t>+1 [Skill 3.A] Generates a user name in the correct format using substring and concatenation</a:t>
+            </a:r>
+          </a:p>
+          <a:p>
+            <a:pPr>
+              <a:defRPr sz="1100">
+                <a:solidFill>
+                  <a:srgbClr val="000000"/>
+                </a:solidFill>
+                <a:latin typeface="Courier New"/>
+                <a:ea typeface="Courier New"/>
+                <a:cs typeface="Courier New"/>
+                <a:sym typeface="Courier New"/>
+              </a:defRPr>
+            </a:pPr>
+            <a:r>
+              <a:t>+1 [Skill 3.D] Adds possible user names to possibleNames</a:t>
+            </a:r>
+          </a:p>
+          <a:p>
+            <a:pPr>
+              <a:defRPr b="1" sz="1100">
+                <a:solidFill>
+                  <a:srgbClr val="000000"/>
+                </a:solidFill>
+                <a:latin typeface="Courier New"/>
+                <a:ea typeface="Courier New"/>
+                <a:cs typeface="Courier New"/>
+                <a:sym typeface="Courier New"/>
+              </a:defRPr>
+            </a:pPr>
+            <a:r>
+              <a:t>General Penalties:</a:t>
+            </a:r>
+          </a:p>
+          <a:p>
+            <a:pPr>
+              <a:defRPr sz="1100">
+                <a:solidFill>
+                  <a:srgbClr val="000000"/>
+                </a:solidFill>
+                <a:latin typeface="Courier New"/>
+                <a:ea typeface="Courier New"/>
+                <a:cs typeface="Courier New"/>
+                <a:sym typeface="Courier New"/>
+              </a:defRPr>
+            </a:pPr>
+            <a:r>
+              <a:t>-1 (v) Array/collection access confusion ([] get)</a:t>
+            </a:r>
+          </a:p>
+          <a:p>
+            <a:pPr>
+              <a:defRPr sz="1100">
+                <a:solidFill>
+                  <a:srgbClr val="000000"/>
+                </a:solidFill>
+                <a:latin typeface="Courier New"/>
+                <a:ea typeface="Courier New"/>
+                <a:cs typeface="Courier New"/>
+                <a:sym typeface="Courier New"/>
+              </a:defRPr>
+            </a:pPr>
+            <a:r>
+              <a:t>-1 (w) Extraneous code that causes side effect (e.g., printing to output, incorrect precondition check)</a:t>
+            </a:r>
+          </a:p>
+          <a:p>
+            <a:pPr>
+              <a:defRPr sz="1100">
+                <a:solidFill>
+                  <a:srgbClr val="000000"/>
+                </a:solidFill>
+                <a:latin typeface="Courier New"/>
+                <a:ea typeface="Courier New"/>
+                <a:cs typeface="Courier New"/>
+                <a:sym typeface="Courier New"/>
+              </a:defRPr>
+            </a:pPr>
+            <a:r>
+              <a:t>-1 (x) Local variables used but none declared</a:t>
+            </a:r>
+          </a:p>
+          <a:p>
+            <a:pPr>
+              <a:defRPr sz="1100">
+                <a:solidFill>
+                  <a:srgbClr val="000000"/>
+                </a:solidFill>
+                <a:latin typeface="Courier New"/>
+                <a:ea typeface="Courier New"/>
+                <a:cs typeface="Courier New"/>
+                <a:sym typeface="Courier New"/>
+              </a:defRPr>
+            </a:pPr>
+            <a:r>
+              <a:t>-1 (z) Void method or constructor that returns a value</a:t>
             </a:r>
           </a:p>
         </p:txBody>
       </p:sp>
-      <p:pic>
-        <p:nvPicPr>
-          <p:cNvPr id="208" name="original.png" descr="original.png"/>
-          <p:cNvPicPr>
-            <a:picLocks noChangeAspect="1"/>
-          </p:cNvPicPr>
-          <p:nvPr/>
-        </p:nvPicPr>
-        <p:blipFill>
-          <a:blip r:embed="rId3">
-            <a:extLst/>
-          </a:blip>
-          <a:stretch>
-            <a:fillRect/>
-          </a:stretch>
-        </p:blipFill>
-        <p:spPr>
-          <a:xfrm>
-            <a:off x="4027929" y="3200595"/>
-            <a:ext cx="3603234" cy="1390865"/>
-          </a:xfrm>
-          <a:prstGeom prst="rect">
-            <a:avLst/>
-          </a:prstGeom>
-          <a:ln w="12700">
-            <a:miter lim="400000"/>
-          </a:ln>
-        </p:spPr>
-      </p:pic>
     </p:spTree>
   </p:cSld>
   <p:clrMapOvr>
@@ -6762,6 +6887,418 @@
                       </p:childTnLst>
                     </p:cTn>
                   </p:par>
+                </p:childTnLst>
+              </p:cTn>
+              <p:prevCondLst>
+                <p:cond evt="onPrev">
+                  <p:tgtEl>
+                    <p:sldTgt/>
+                  </p:tgtEl>
+                </p:cond>
+              </p:prevCondLst>
+              <p:nextCondLst>
+                <p:cond evt="onNext">
+                  <p:tgtEl>
+                    <p:sldTgt/>
+                  </p:tgtEl>
+                </p:cond>
+              </p:nextCondLst>
+            </p:seq>
+          </p:childTnLst>
+        </p:cTn>
+      </p:par>
+    </p:tnLst>
+    <p:bldLst>
+      <p:bldP build="whole" bldLvl="1" animBg="1" rev="0" advAuto="0" spid="205" grpId="1"/>
+    </p:bldLst>
+  </p:timing>
+</p:sld>
+</file>
+
+<file path=ppt/slides/slide6.xml><?xml version="1.0" encoding="utf-8"?>
+<p:sld xmlns:a="http://schemas.openxmlformats.org/drawingml/2006/main" xmlns:r="http://schemas.openxmlformats.org/officeDocument/2006/relationships" xmlns:p="http://schemas.openxmlformats.org/presentationml/2006/main" xmlns:m="http://schemas.openxmlformats.org/officeDocument/2006/math" xmlns:a14="http://schemas.microsoft.com/office/drawing/2010/main" showMasterSp="1" showMasterPhAnim="1">
+  <p:cSld>
+    <p:spTree>
+      <p:nvGrpSpPr>
+        <p:cNvPr id="1" name=""/>
+        <p:cNvGrpSpPr/>
+        <p:nvPr/>
+      </p:nvGrpSpPr>
+      <p:grpSpPr>
+        <a:xfrm>
+          <a:off x="0" y="0"/>
+          <a:ext cx="0" cy="0"/>
+          <a:chOff x="0" y="0"/>
+          <a:chExt cx="0" cy="0"/>
+        </a:xfrm>
+      </p:grpSpPr>
+      <p:grpSp>
+        <p:nvGrpSpPr>
+          <p:cNvPr id="213" name="Google Shape;118;p19"/>
+          <p:cNvGrpSpPr/>
+          <p:nvPr/>
+        </p:nvGrpSpPr>
+        <p:grpSpPr>
+          <a:xfrm>
+            <a:off x="1959742" y="39976"/>
+            <a:ext cx="6244203" cy="914171"/>
+            <a:chOff x="-1" y="0"/>
+            <a:chExt cx="6244202" cy="914170"/>
+          </a:xfrm>
+        </p:grpSpPr>
+        <p:sp>
+          <p:nvSpPr>
+            <p:cNvPr id="209" name="Rectangle"/>
+            <p:cNvSpPr/>
+            <p:nvPr/>
+          </p:nvSpPr>
+          <p:spPr>
+            <a:xfrm>
+              <a:off x="-2" y="0"/>
+              <a:ext cx="5574802" cy="914171"/>
+            </a:xfrm>
+            <a:prstGeom prst="rect">
+              <a:avLst/>
+            </a:prstGeom>
+            <a:noFill/>
+            <a:ln w="25400" cap="flat">
+              <a:solidFill>
+                <a:schemeClr val="accent1"/>
+              </a:solidFill>
+              <a:prstDash val="solid"/>
+              <a:round/>
+            </a:ln>
+            <a:effectLst/>
+          </p:spPr>
+          <p:txBody>
+            <a:bodyPr wrap="square" lIns="0" tIns="0" rIns="0" bIns="0" numCol="1" anchor="t">
+              <a:noAutofit/>
+            </a:bodyPr>
+            <a:lstStyle/>
+            <a:p>
+              <a:pPr defTabSz="795527">
+                <a:defRPr sz="1200">
+                  <a:solidFill>
+                    <a:schemeClr val="accent5"/>
+                  </a:solidFill>
+                </a:defRPr>
+              </a:pPr>
+            </a:p>
+          </p:txBody>
+        </p:sp>
+        <p:grpSp>
+          <p:nvGrpSpPr>
+            <p:cNvPr id="212" name="Do now…"/>
+            <p:cNvGrpSpPr/>
+            <p:nvPr/>
+          </p:nvGrpSpPr>
+          <p:grpSpPr>
+            <a:xfrm>
+              <a:off x="11594" y="11594"/>
+              <a:ext cx="6232608" cy="890981"/>
+              <a:chOff x="-1" y="-1"/>
+              <a:chExt cx="6232606" cy="890979"/>
+            </a:xfrm>
+          </p:grpSpPr>
+          <p:sp>
+            <p:nvSpPr>
+              <p:cNvPr id="210" name="Rectangle"/>
+              <p:cNvSpPr/>
+              <p:nvPr/>
+            </p:nvSpPr>
+            <p:spPr>
+              <a:xfrm>
+                <a:off x="-2" y="-2"/>
+                <a:ext cx="6232608" cy="890981"/>
+              </a:xfrm>
+              <a:prstGeom prst="rect">
+                <a:avLst/>
+              </a:prstGeom>
+              <a:solidFill>
+                <a:srgbClr val="FFFFFF"/>
+              </a:solidFill>
+              <a:ln w="25400" cap="flat">
+                <a:solidFill>
+                  <a:schemeClr val="accent1"/>
+                </a:solidFill>
+                <a:prstDash val="solid"/>
+                <a:round/>
+              </a:ln>
+              <a:effectLst/>
+            </p:spPr>
+            <p:txBody>
+              <a:bodyPr wrap="square" lIns="0" tIns="0" rIns="0" bIns="0" numCol="1" anchor="t">
+                <a:noAutofit/>
+              </a:bodyPr>
+              <a:lstStyle/>
+              <a:p>
+                <a:pPr defTabSz="507148">
+                  <a:defRPr sz="1300">
+                    <a:solidFill>
+                      <a:schemeClr val="accent5"/>
+                    </a:solidFill>
+                  </a:defRPr>
+                </a:pPr>
+              </a:p>
+            </p:txBody>
+          </p:sp>
+          <p:sp>
+            <p:nvSpPr>
+              <p:cNvPr id="211" name="Practice problem #1…"/>
+              <p:cNvSpPr txBox="1"/>
+              <p:nvPr/>
+            </p:nvSpPr>
+            <p:spPr>
+              <a:xfrm>
+                <a:off x="15569" y="15569"/>
+                <a:ext cx="6201466" cy="859839"/>
+              </a:xfrm>
+              <a:prstGeom prst="rect">
+                <a:avLst/>
+              </a:prstGeom>
+              <a:noFill/>
+              <a:ln w="12700" cap="flat">
+                <a:noFill/>
+                <a:miter lim="400000"/>
+              </a:ln>
+              <a:effectLst/>
+              <a:extLst>
+                <a:ext uri="{C572A759-6A51-4108-AA02-DFA0A04FC94B}">
+                  <ma14:wrappingTextBoxFlag xmlns:ma14="http://schemas.microsoft.com/office/mac/drawingml/2011/main" val="1"/>
+                </a:ext>
+              </a:extLst>
+            </p:spPr>
+            <p:txBody>
+              <a:bodyPr wrap="square" lIns="91421" tIns="91421" rIns="91421" bIns="91421" numCol="1" anchor="t">
+                <a:normAutofit fontScale="100000" lnSpcReduction="0"/>
+              </a:bodyPr>
+              <a:lstStyle>
+                <a:lvl1pPr defTabSz="502076">
+                  <a:defRPr sz="1979">
+                    <a:latin typeface="+mn-lt"/>
+                    <a:ea typeface="+mn-ea"/>
+                    <a:cs typeface="+mn-cs"/>
+                    <a:sym typeface="Arial"/>
+                  </a:defRPr>
+                </a:lvl1pPr>
+              </a:lstStyle>
+              <a:p>
+                <a:pPr/>
+                <a:r>
+                  <a:t>Independent work: ArrayList Free Response Question</a:t>
+                </a:r>
+              </a:p>
+            </p:txBody>
+          </p:sp>
+        </p:grpSp>
+      </p:grpSp>
+      <p:sp>
+        <p:nvSpPr>
+          <p:cNvPr id="214" name="be sure to……"/>
+          <p:cNvSpPr txBox="1"/>
+          <p:nvPr/>
+        </p:nvSpPr>
+        <p:spPr>
+          <a:xfrm>
+            <a:off x="4520392" y="1208675"/>
+            <a:ext cx="3491724" cy="698501"/>
+          </a:xfrm>
+          <a:prstGeom prst="rect">
+            <a:avLst/>
+          </a:prstGeom>
+          <a:ln w="12700">
+            <a:miter lim="400000"/>
+          </a:ln>
+          <a:extLst>
+            <a:ext uri="{C572A759-6A51-4108-AA02-DFA0A04FC94B}">
+              <ma14:wrappingTextBoxFlag xmlns:ma14="http://schemas.microsoft.com/office/mac/drawingml/2011/main" val="1"/>
+            </a:ext>
+          </a:extLst>
+        </p:spPr>
+        <p:txBody>
+          <a:bodyPr lIns="0" tIns="0" rIns="0" bIns="0">
+            <a:spAutoFit/>
+          </a:bodyPr>
+          <a:lstStyle/>
+          <a:p>
+            <a:pPr defTabSz="507148">
+              <a:defRPr sz="1300">
+                <a:solidFill>
+                  <a:schemeClr val="accent5"/>
+                </a:solidFill>
+              </a:defRPr>
+            </a:pPr>
+            <a:r>
+              <a:t>be sure to…</a:t>
+            </a:r>
+          </a:p>
+          <a:p>
+            <a:pPr marL="147052" indent="-147052">
+              <a:buSzPct val="100000"/>
+              <a:buAutoNum type="arabicPeriod" startAt="1"/>
+              <a:defRPr sz="1100">
+                <a:solidFill>
+                  <a:srgbClr val="000000"/>
+                </a:solidFill>
+              </a:defRPr>
+            </a:pPr>
+            <a:r>
+              <a:t>Carefully read the instructions.</a:t>
+            </a:r>
+          </a:p>
+          <a:p>
+            <a:pPr marL="147052" indent="-147052">
+              <a:buSzPct val="100000"/>
+              <a:buAutoNum type="arabicPeriod" startAt="1"/>
+              <a:defRPr sz="1100">
+                <a:solidFill>
+                  <a:srgbClr val="000000"/>
+                </a:solidFill>
+              </a:defRPr>
+            </a:pPr>
+            <a:r>
+              <a:t>Review the grading rubric to the left.</a:t>
+            </a:r>
+          </a:p>
+          <a:p>
+            <a:pPr marL="147052" indent="-147052">
+              <a:buSzPct val="100000"/>
+              <a:buAutoNum type="arabicPeriod" startAt="1"/>
+              <a:defRPr sz="1100">
+                <a:solidFill>
+                  <a:srgbClr val="000000"/>
+                </a:solidFill>
+              </a:defRPr>
+            </a:pPr>
+            <a:r>
+              <a:t>With a partner work through each problem.</a:t>
+            </a:r>
+          </a:p>
+        </p:txBody>
+      </p:sp>
+      <p:sp>
+        <p:nvSpPr>
+          <p:cNvPr id="215" name="Part (1) solution:"/>
+          <p:cNvSpPr txBox="1"/>
+          <p:nvPr/>
+        </p:nvSpPr>
+        <p:spPr>
+          <a:xfrm>
+            <a:off x="4618508" y="2161703"/>
+            <a:ext cx="1366516" cy="215901"/>
+          </a:xfrm>
+          <a:prstGeom prst="rect">
+            <a:avLst/>
+          </a:prstGeom>
+          <a:ln w="12700">
+            <a:miter lim="400000"/>
+          </a:ln>
+          <a:extLst>
+            <a:ext uri="{C572A759-6A51-4108-AA02-DFA0A04FC94B}">
+              <ma14:wrappingTextBoxFlag xmlns:ma14="http://schemas.microsoft.com/office/mac/drawingml/2011/main" val="1"/>
+            </a:ext>
+          </a:extLst>
+        </p:spPr>
+        <p:txBody>
+          <a:bodyPr wrap="none" lIns="0" tIns="0" rIns="0" bIns="0">
+            <a:spAutoFit/>
+          </a:bodyPr>
+          <a:lstStyle/>
+          <a:p>
+            <a:pPr/>
+            <a:r>
+              <a:t>Part (1) solution: </a:t>
+            </a:r>
+          </a:p>
+        </p:txBody>
+      </p:sp>
+      <p:pic>
+        <p:nvPicPr>
+          <p:cNvPr id="216" name="original.png" descr="original.png"/>
+          <p:cNvPicPr>
+            <a:picLocks noChangeAspect="1"/>
+          </p:cNvPicPr>
+          <p:nvPr/>
+        </p:nvPicPr>
+        <p:blipFill>
+          <a:blip r:embed="rId2">
+            <a:extLst/>
+          </a:blip>
+          <a:stretch>
+            <a:fillRect/>
+          </a:stretch>
+        </p:blipFill>
+        <p:spPr>
+          <a:xfrm>
+            <a:off x="3188851" y="2388178"/>
+            <a:ext cx="4821945" cy="1861293"/>
+          </a:xfrm>
+          <a:prstGeom prst="rect">
+            <a:avLst/>
+          </a:prstGeom>
+          <a:ln w="12700">
+            <a:miter lim="400000"/>
+          </a:ln>
+        </p:spPr>
+      </p:pic>
+    </p:spTree>
+  </p:cSld>
+  <p:clrMapOvr>
+    <a:masterClrMapping/>
+  </p:clrMapOvr>
+  <p:transition xmlns:p14="http://schemas.microsoft.com/office/powerpoint/2010/main" spd="med" advClick="1"/>
+  <p:timing>
+    <p:tnLst>
+      <p:par>
+        <p:cTn id="1" nodeType="tmRoot" restart="never" dur="indefinite" fill="hold">
+          <p:childTnLst>
+            <p:seq concurrent="1" prevAc="none" nextAc="seek">
+              <p:cTn id="2" nodeType="mainSeq" dur="indefinite" fill="hold">
+                <p:childTnLst>
+                  <p:par>
+                    <p:cTn id="3" fill="hold">
+                      <p:stCondLst>
+                        <p:cond delay="indefinite"/>
+                      </p:stCondLst>
+                      <p:childTnLst>
+                        <p:par>
+                          <p:cTn id="4" fill="hold">
+                            <p:stCondLst>
+                              <p:cond delay="0"/>
+                            </p:stCondLst>
+                            <p:childTnLst>
+                              <p:par>
+                                <p:cTn id="5" presetClass="entr" nodeType="clickEffect" presetSubtype="0" presetID="1" grpId="1" fill="hold">
+                                  <p:stCondLst>
+                                    <p:cond delay="0"/>
+                                  </p:stCondLst>
+                                  <p:iterate type="el" backwards="0">
+                                    <p:tmAbs val="0"/>
+                                  </p:iterate>
+                                  <p:childTnLst>
+                                    <p:set>
+                                      <p:cBhvr>
+                                        <p:cTn id="6" fill="hold"/>
+                                        <p:tgtEl>
+                                          <p:spTgt spid="214"/>
+                                        </p:tgtEl>
+                                        <p:attrNameLst>
+                                          <p:attrName>style.visibility</p:attrName>
+                                        </p:attrNameLst>
+                                      </p:cBhvr>
+                                      <p:to>
+                                        <p:strVal val="visible"/>
+                                      </p:to>
+                                    </p:set>
+                                  </p:childTnLst>
+                                </p:cTn>
+                              </p:par>
+                            </p:childTnLst>
+                          </p:cTn>
+                        </p:par>
+                      </p:childTnLst>
+                    </p:cTn>
+                  </p:par>
                   <p:par>
                     <p:cTn id="7" fill="hold">
                       <p:stCondLst>
@@ -6787,7 +7324,7 @@
                                       <p:cBhvr>
                                         <p:cTn id="10" fill="hold"/>
                                         <p:tgtEl>
-                                          <p:spTgt spid="208"/>
+                                          <p:spTgt spid="216"/>
                                         </p:tgtEl>
                                         <p:attrNameLst>
                                           <p:attrName>style.visibility</p:attrName>
@@ -6831,7 +7368,7 @@
                                       <p:cBhvr>
                                         <p:cTn id="14" fill="hold"/>
                                         <p:tgtEl>
-                                          <p:spTgt spid="207"/>
+                                          <p:spTgt spid="215"/>
                                         </p:tgtEl>
                                         <p:attrNameLst>
                                           <p:attrName>style.visibility</p:attrName>
@@ -6872,15 +7409,15 @@
       </p:par>
     </p:tnLst>
     <p:bldLst>
-      <p:bldP build="whole" bldLvl="1" animBg="1" rev="0" advAuto="0" spid="208" grpId="2"/>
-      <p:bldP build="whole" bldLvl="1" animBg="1" rev="0" advAuto="0" spid="207" grpId="3"/>
-      <p:bldP build="whole" bldLvl="1" animBg="1" rev="0" advAuto="0" spid="205" grpId="1"/>
+      <p:bldP build="whole" bldLvl="1" animBg="1" rev="0" advAuto="0" spid="216" grpId="2"/>
+      <p:bldP build="whole" bldLvl="1" animBg="1" rev="0" advAuto="0" spid="214" grpId="1"/>
+      <p:bldP build="whole" bldLvl="1" animBg="1" rev="0" advAuto="0" spid="215" grpId="3"/>
     </p:bldLst>
   </p:timing>
 </p:sld>
 </file>
 
-<file path=ppt/slides/slide6.xml><?xml version="1.0" encoding="utf-8"?>
+<file path=ppt/slides/slide7.xml><?xml version="1.0" encoding="utf-8"?>
 <p:sld xmlns:a="http://schemas.openxmlformats.org/drawingml/2006/main" xmlns:r="http://schemas.openxmlformats.org/officeDocument/2006/relationships" xmlns:p="http://schemas.openxmlformats.org/presentationml/2006/main" xmlns:m="http://schemas.openxmlformats.org/officeDocument/2006/math" xmlns:a14="http://schemas.microsoft.com/office/drawing/2010/main" showMasterSp="1" showMasterPhAnim="1">
   <p:cSld>
     <p:spTree>
@@ -6899,7 +7436,7 @@
       </p:grpSpPr>
       <p:sp>
         <p:nvSpPr>
-          <p:cNvPr id="210" name="Reflection:…"/>
+          <p:cNvPr id="218" name="Reflection:…"/>
           <p:cNvSpPr txBox="1"/>
           <p:nvPr>
             <p:ph type="title"/>
@@ -6982,7 +7519,7 @@
       </p:sp>
       <p:sp>
         <p:nvSpPr>
-          <p:cNvPr id="211" name="What are some unexpected challenges that you ran into while working on the activities for today’s class?…"/>
+          <p:cNvPr id="219" name="What are some unexpected challenges that you ran into while working on the activities for today’s class?…"/>
           <p:cNvSpPr txBox="1"/>
           <p:nvPr/>
         </p:nvSpPr>

</xml_diff>